<commit_message>
Made basic menus and connected rover to raylib app
</commit_message>
<xml_diff>
--- a/MAZ-NAV-APP/MAZ-NAV-APP/resources/FlowChart.pptx
+++ b/MAZ-NAV-APP/MAZ-NAV-APP/resources/FlowChart.pptx
@@ -104,6 +104,11 @@
       </a:defRPr>
     </a:lvl9pPr>
   </p:defaultTextStyle>
+  <p:extLst>
+    <p:ext uri="{EFAFB233-063F-42B5-8137-9DF3F51BA10A}">
+      <p15:sldGuideLst xmlns:p15="http://schemas.microsoft.com/office/powerpoint/2012/main"/>
+    </p:ext>
+  </p:extLst>
 </p:presentation>
 </file>
 
@@ -256,7 +261,7 @@
           <a:p>
             <a:fld id="{B4A4EE27-AE5A-4A8E-960D-78AAFAB90B79}" type="datetimeFigureOut">
               <a:rPr lang="LID4096" smtClean="0"/>
-              <a:t>12/08/2023</a:t>
+              <a:t>12/10/2023</a:t>
             </a:fld>
             <a:endParaRPr lang="LID4096"/>
           </a:p>
@@ -456,7 +461,7 @@
           <a:p>
             <a:fld id="{B4A4EE27-AE5A-4A8E-960D-78AAFAB90B79}" type="datetimeFigureOut">
               <a:rPr lang="LID4096" smtClean="0"/>
-              <a:t>12/08/2023</a:t>
+              <a:t>12/10/2023</a:t>
             </a:fld>
             <a:endParaRPr lang="LID4096"/>
           </a:p>
@@ -666,7 +671,7 @@
           <a:p>
             <a:fld id="{B4A4EE27-AE5A-4A8E-960D-78AAFAB90B79}" type="datetimeFigureOut">
               <a:rPr lang="LID4096" smtClean="0"/>
-              <a:t>12/08/2023</a:t>
+              <a:t>12/10/2023</a:t>
             </a:fld>
             <a:endParaRPr lang="LID4096"/>
           </a:p>
@@ -866,7 +871,7 @@
           <a:p>
             <a:fld id="{B4A4EE27-AE5A-4A8E-960D-78AAFAB90B79}" type="datetimeFigureOut">
               <a:rPr lang="LID4096" smtClean="0"/>
-              <a:t>12/08/2023</a:t>
+              <a:t>12/10/2023</a:t>
             </a:fld>
             <a:endParaRPr lang="LID4096"/>
           </a:p>
@@ -1142,7 +1147,7 @@
           <a:p>
             <a:fld id="{B4A4EE27-AE5A-4A8E-960D-78AAFAB90B79}" type="datetimeFigureOut">
               <a:rPr lang="LID4096" smtClean="0"/>
-              <a:t>12/08/2023</a:t>
+              <a:t>12/10/2023</a:t>
             </a:fld>
             <a:endParaRPr lang="LID4096"/>
           </a:p>
@@ -1410,7 +1415,7 @@
           <a:p>
             <a:fld id="{B4A4EE27-AE5A-4A8E-960D-78AAFAB90B79}" type="datetimeFigureOut">
               <a:rPr lang="LID4096" smtClean="0"/>
-              <a:t>12/08/2023</a:t>
+              <a:t>12/10/2023</a:t>
             </a:fld>
             <a:endParaRPr lang="LID4096"/>
           </a:p>
@@ -1825,7 +1830,7 @@
           <a:p>
             <a:fld id="{B4A4EE27-AE5A-4A8E-960D-78AAFAB90B79}" type="datetimeFigureOut">
               <a:rPr lang="LID4096" smtClean="0"/>
-              <a:t>12/08/2023</a:t>
+              <a:t>12/10/2023</a:t>
             </a:fld>
             <a:endParaRPr lang="LID4096"/>
           </a:p>
@@ -1967,7 +1972,7 @@
           <a:p>
             <a:fld id="{B4A4EE27-AE5A-4A8E-960D-78AAFAB90B79}" type="datetimeFigureOut">
               <a:rPr lang="LID4096" smtClean="0"/>
-              <a:t>12/08/2023</a:t>
+              <a:t>12/10/2023</a:t>
             </a:fld>
             <a:endParaRPr lang="LID4096"/>
           </a:p>
@@ -2080,7 +2085,7 @@
           <a:p>
             <a:fld id="{B4A4EE27-AE5A-4A8E-960D-78AAFAB90B79}" type="datetimeFigureOut">
               <a:rPr lang="LID4096" smtClean="0"/>
-              <a:t>12/08/2023</a:t>
+              <a:t>12/10/2023</a:t>
             </a:fld>
             <a:endParaRPr lang="LID4096"/>
           </a:p>
@@ -2393,7 +2398,7 @@
           <a:p>
             <a:fld id="{B4A4EE27-AE5A-4A8E-960D-78AAFAB90B79}" type="datetimeFigureOut">
               <a:rPr lang="LID4096" smtClean="0"/>
-              <a:t>12/08/2023</a:t>
+              <a:t>12/10/2023</a:t>
             </a:fld>
             <a:endParaRPr lang="LID4096"/>
           </a:p>
@@ -2682,7 +2687,7 @@
           <a:p>
             <a:fld id="{B4A4EE27-AE5A-4A8E-960D-78AAFAB90B79}" type="datetimeFigureOut">
               <a:rPr lang="LID4096" smtClean="0"/>
-              <a:t>12/08/2023</a:t>
+              <a:t>12/10/2023</a:t>
             </a:fld>
             <a:endParaRPr lang="LID4096"/>
           </a:p>
@@ -2925,7 +2930,7 @@
           <a:p>
             <a:fld id="{B4A4EE27-AE5A-4A8E-960D-78AAFAB90B79}" type="datetimeFigureOut">
               <a:rPr lang="LID4096" smtClean="0"/>
-              <a:t>12/08/2023</a:t>
+              <a:t>12/10/2023</a:t>
             </a:fld>
             <a:endParaRPr lang="LID4096"/>
           </a:p>
@@ -3851,10 +3856,18 @@
           <a:p>
             <a:pPr algn="ctr"/>
             <a:r>
-              <a:rPr lang="en-GB" dirty="0" err="1"/>
+              <a:rPr lang="en-GB" dirty="0" err="1">
+                <a:solidFill>
+                  <a:srgbClr val="C00000"/>
+                </a:solidFill>
+              </a:rPr>
               <a:t>scanMazes</a:t>
             </a:r>
-            <a:endParaRPr lang="en-GB" dirty="0"/>
+            <a:endParaRPr lang="en-GB" dirty="0">
+              <a:solidFill>
+                <a:srgbClr val="C00000"/>
+              </a:solidFill>
+            </a:endParaRPr>
           </a:p>
           <a:p>
             <a:pPr algn="ctr"/>
@@ -3866,10 +3879,18 @@
           <a:p>
             <a:pPr algn="ctr"/>
             <a:r>
-              <a:rPr lang="en-GB" dirty="0" err="1"/>
+              <a:rPr lang="en-GB" dirty="0" err="1">
+                <a:solidFill>
+                  <a:srgbClr val="FF0000"/>
+                </a:solidFill>
+              </a:rPr>
               <a:t>autoMode</a:t>
             </a:r>
-            <a:endParaRPr lang="en-GB" dirty="0"/>
+            <a:endParaRPr lang="en-GB" dirty="0">
+              <a:solidFill>
+                <a:srgbClr val="FF0000"/>
+              </a:solidFill>
+            </a:endParaRPr>
           </a:p>
           <a:p>
             <a:pPr algn="ctr"/>
@@ -4459,7 +4480,7 @@
           <a:p>
             <a:pPr algn="ctr"/>
             <a:r>
-              <a:rPr lang="en-GB" dirty="0" err="1"/>
+              <a:rPr lang="en-GB"/>
               <a:t>mazeOptions</a:t>
             </a:r>
             <a:endParaRPr lang="LID4096" dirty="0"/>
@@ -4525,14 +4546,14 @@
           <p:cNvCxnSpPr>
             <a:cxnSpLocks/>
             <a:stCxn id="52" idx="2"/>
-            <a:endCxn id="51" idx="0"/>
+            <a:endCxn id="3" idx="0"/>
           </p:cNvCxnSpPr>
           <p:nvPr/>
         </p:nvCxnSpPr>
         <p:spPr>
-          <a:xfrm rot="16200000" flipH="1">
-            <a:off x="4387241" y="2520076"/>
-            <a:ext cx="394994" cy="2132688"/>
+          <a:xfrm rot="5400000">
+            <a:off x="3206290" y="3424453"/>
+            <a:ext cx="347635" cy="276574"/>
           </a:xfrm>
           <a:prstGeom prst="bentConnector3">
             <a:avLst>
@@ -4575,7 +4596,7 @@
         </p:nvSpPr>
         <p:spPr>
           <a:xfrm>
-            <a:off x="2598480" y="4181747"/>
+            <a:off x="2114852" y="4681072"/>
             <a:ext cx="1742106" cy="629676"/>
           </a:xfrm>
           <a:prstGeom prst="rect">
@@ -4637,8 +4658,8 @@
         </p:nvCxnSpPr>
         <p:spPr>
           <a:xfrm rot="10800000" flipV="1">
-            <a:off x="4340587" y="4398041"/>
-            <a:ext cx="439443" cy="98543"/>
+            <a:off x="3856959" y="4398042"/>
+            <a:ext cx="923071" cy="597868"/>
           </a:xfrm>
           <a:prstGeom prst="bentConnector3">
             <a:avLst>
@@ -4743,8 +4764,8 @@
         </p:nvCxnSpPr>
         <p:spPr>
           <a:xfrm rot="10800000">
-            <a:off x="1207336" y="4181747"/>
-            <a:ext cx="1391144" cy="314838"/>
+            <a:off x="1207336" y="4181748"/>
+            <a:ext cx="907516" cy="814163"/>
           </a:xfrm>
           <a:prstGeom prst="bentConnector2">
             <a:avLst/>
@@ -4882,7 +4903,7 @@
             <a:avLst/>
           </a:prstGeom>
           <a:solidFill>
-            <a:srgbClr val="00B0F0"/>
+            <a:srgbClr val="C00000"/>
           </a:solidFill>
           <a:ln>
             <a:solidFill>
@@ -4988,7 +5009,7 @@
             <a:avLst/>
           </a:prstGeom>
           <a:solidFill>
-            <a:srgbClr val="00B0F0"/>
+            <a:srgbClr val="C00000"/>
           </a:solidFill>
           <a:ln>
             <a:solidFill>
@@ -5092,7 +5113,7 @@
             <a:avLst/>
           </a:prstGeom>
           <a:solidFill>
-            <a:srgbClr val="00B0F0"/>
+            <a:srgbClr val="C00000"/>
           </a:solidFill>
           <a:ln>
             <a:solidFill>
@@ -5123,7 +5144,7 @@
             <a:pPr algn="ctr"/>
             <a:r>
               <a:rPr lang="en-GB" dirty="0" err="1"/>
-              <a:t>DisplayMaze</a:t>
+              <a:t>DisplayMazeSolution</a:t>
             </a:r>
             <a:endParaRPr lang="LID4096" dirty="0"/>
           </a:p>
@@ -5337,7 +5358,7 @@
             <a:avLst/>
           </a:prstGeom>
           <a:solidFill>
-            <a:srgbClr val="00B0F0"/>
+            <a:srgbClr val="C00000"/>
           </a:solidFill>
           <a:ln>
             <a:solidFill>
@@ -5442,7 +5463,7 @@
             <a:avLst/>
           </a:prstGeom>
           <a:solidFill>
-            <a:srgbClr val="00B0F0"/>
+            <a:srgbClr val="C00000"/>
           </a:solidFill>
           <a:ln>
             <a:solidFill>
@@ -5494,6 +5515,298 @@
         <p:spPr>
           <a:xfrm>
             <a:off x="9043566" y="5669827"/>
+            <a:ext cx="1846140" cy="629676"/>
+          </a:xfrm>
+          <a:prstGeom prst="rect">
+            <a:avLst/>
+          </a:prstGeom>
+          <a:solidFill>
+            <a:srgbClr val="C00000"/>
+          </a:solidFill>
+          <a:ln>
+            <a:solidFill>
+              <a:srgbClr val="0070C0"/>
+            </a:solidFill>
+          </a:ln>
+        </p:spPr>
+        <p:style>
+          <a:lnRef idx="2">
+            <a:schemeClr val="accent1">
+              <a:shade val="15000"/>
+            </a:schemeClr>
+          </a:lnRef>
+          <a:fillRef idx="1">
+            <a:schemeClr val="accent1"/>
+          </a:fillRef>
+          <a:effectRef idx="0">
+            <a:schemeClr val="accent1"/>
+          </a:effectRef>
+          <a:fontRef idx="minor">
+            <a:schemeClr val="lt1"/>
+          </a:fontRef>
+        </p:style>
+        <p:txBody>
+          <a:bodyPr rtlCol="0" anchor="ctr"/>
+          <a:lstStyle/>
+          <a:p>
+            <a:pPr algn="ctr"/>
+            <a:r>
+              <a:rPr lang="en-GB" dirty="0" err="1"/>
+              <a:t>ScanningScreen</a:t>
+            </a:r>
+            <a:endParaRPr lang="LID4096" dirty="0"/>
+          </a:p>
+        </p:txBody>
+      </p:sp>
+      <p:cxnSp>
+        <p:nvCxnSpPr>
+          <p:cNvPr id="152" name="Straight Arrow Connector 151">
+            <a:extLst>
+              <a:ext uri="{FF2B5EF4-FFF2-40B4-BE49-F238E27FC236}">
+                <a16:creationId xmlns:a16="http://schemas.microsoft.com/office/drawing/2014/main" id="{C7E22575-6C4D-B939-7776-31987DE54368}"/>
+              </a:ext>
+            </a:extLst>
+          </p:cNvPr>
+          <p:cNvCxnSpPr>
+            <a:cxnSpLocks/>
+            <a:stCxn id="134" idx="2"/>
+            <a:endCxn id="140" idx="0"/>
+          </p:cNvCxnSpPr>
+          <p:nvPr/>
+        </p:nvCxnSpPr>
+        <p:spPr>
+          <a:xfrm>
+            <a:off x="9966636" y="4447313"/>
+            <a:ext cx="0" cy="278703"/>
+          </a:xfrm>
+          <a:prstGeom prst="straightConnector1">
+            <a:avLst/>
+          </a:prstGeom>
+          <a:ln w="28575">
+            <a:solidFill>
+              <a:schemeClr val="tx1"/>
+            </a:solidFill>
+            <a:tailEnd type="triangle"/>
+          </a:ln>
+        </p:spPr>
+        <p:style>
+          <a:lnRef idx="1">
+            <a:schemeClr val="accent1"/>
+          </a:lnRef>
+          <a:fillRef idx="0">
+            <a:schemeClr val="accent1"/>
+          </a:fillRef>
+          <a:effectRef idx="0">
+            <a:schemeClr val="accent1"/>
+          </a:effectRef>
+          <a:fontRef idx="minor">
+            <a:schemeClr val="tx1"/>
+          </a:fontRef>
+        </p:style>
+      </p:cxnSp>
+      <p:cxnSp>
+        <p:nvCxnSpPr>
+          <p:cNvPr id="155" name="Straight Arrow Connector 154">
+            <a:extLst>
+              <a:ext uri="{FF2B5EF4-FFF2-40B4-BE49-F238E27FC236}">
+                <a16:creationId xmlns:a16="http://schemas.microsoft.com/office/drawing/2014/main" id="{DCB2E483-F13D-2399-130B-52CA29F03869}"/>
+              </a:ext>
+            </a:extLst>
+          </p:cNvPr>
+          <p:cNvCxnSpPr>
+            <a:cxnSpLocks/>
+            <a:stCxn id="140" idx="2"/>
+            <a:endCxn id="151" idx="0"/>
+          </p:cNvCxnSpPr>
+          <p:nvPr/>
+        </p:nvCxnSpPr>
+        <p:spPr>
+          <a:xfrm>
+            <a:off x="9966636" y="5355692"/>
+            <a:ext cx="0" cy="314135"/>
+          </a:xfrm>
+          <a:prstGeom prst="straightConnector1">
+            <a:avLst/>
+          </a:prstGeom>
+          <a:ln w="28575">
+            <a:solidFill>
+              <a:schemeClr val="tx1"/>
+            </a:solidFill>
+            <a:tailEnd type="triangle"/>
+          </a:ln>
+        </p:spPr>
+        <p:style>
+          <a:lnRef idx="1">
+            <a:schemeClr val="accent1"/>
+          </a:lnRef>
+          <a:fillRef idx="0">
+            <a:schemeClr val="accent1"/>
+          </a:fillRef>
+          <a:effectRef idx="0">
+            <a:schemeClr val="accent1"/>
+          </a:effectRef>
+          <a:fontRef idx="minor">
+            <a:schemeClr val="tx1"/>
+          </a:fontRef>
+        </p:style>
+      </p:cxnSp>
+      <p:cxnSp>
+        <p:nvCxnSpPr>
+          <p:cNvPr id="158" name="Connector: Elbow 157">
+            <a:extLst>
+              <a:ext uri="{FF2B5EF4-FFF2-40B4-BE49-F238E27FC236}">
+                <a16:creationId xmlns:a16="http://schemas.microsoft.com/office/drawing/2014/main" id="{F168582A-3304-B5FE-C1B4-E0BF93408591}"/>
+              </a:ext>
+            </a:extLst>
+          </p:cNvPr>
+          <p:cNvCxnSpPr>
+            <a:cxnSpLocks/>
+            <a:stCxn id="151" idx="3"/>
+            <a:endCxn id="134" idx="3"/>
+          </p:cNvCxnSpPr>
+          <p:nvPr/>
+        </p:nvCxnSpPr>
+        <p:spPr>
+          <a:xfrm flipV="1">
+            <a:off x="10889706" y="4132475"/>
+            <a:ext cx="12700" cy="1852190"/>
+          </a:xfrm>
+          <a:prstGeom prst="bentConnector3">
+            <a:avLst>
+              <a:gd name="adj1" fmla="val 1800000"/>
+            </a:avLst>
+          </a:prstGeom>
+          <a:ln w="19050">
+            <a:solidFill>
+              <a:schemeClr val="tx1"/>
+            </a:solidFill>
+            <a:tailEnd type="triangle"/>
+          </a:ln>
+        </p:spPr>
+        <p:style>
+          <a:lnRef idx="1">
+            <a:schemeClr val="accent1"/>
+          </a:lnRef>
+          <a:fillRef idx="0">
+            <a:schemeClr val="accent1"/>
+          </a:fillRef>
+          <a:effectRef idx="0">
+            <a:schemeClr val="accent1"/>
+          </a:effectRef>
+          <a:fontRef idx="minor">
+            <a:schemeClr val="tx1"/>
+          </a:fontRef>
+        </p:style>
+      </p:cxnSp>
+      <p:cxnSp>
+        <p:nvCxnSpPr>
+          <p:cNvPr id="162" name="Connector: Elbow 161">
+            <a:extLst>
+              <a:ext uri="{FF2B5EF4-FFF2-40B4-BE49-F238E27FC236}">
+                <a16:creationId xmlns:a16="http://schemas.microsoft.com/office/drawing/2014/main" id="{C36BCE45-8FCE-391A-9D6A-EE866F9FFD3B}"/>
+              </a:ext>
+            </a:extLst>
+          </p:cNvPr>
+          <p:cNvCxnSpPr>
+            <a:cxnSpLocks/>
+            <a:stCxn id="151" idx="1"/>
+            <a:endCxn id="23" idx="2"/>
+          </p:cNvCxnSpPr>
+          <p:nvPr/>
+        </p:nvCxnSpPr>
+        <p:spPr>
+          <a:xfrm rot="10800000">
+            <a:off x="8661234" y="3377477"/>
+            <a:ext cx="382333" cy="2607189"/>
+          </a:xfrm>
+          <a:prstGeom prst="bentConnector2">
+            <a:avLst/>
+          </a:prstGeom>
+          <a:ln w="19050">
+            <a:solidFill>
+              <a:schemeClr val="tx1"/>
+            </a:solidFill>
+            <a:tailEnd type="triangle"/>
+          </a:ln>
+        </p:spPr>
+        <p:style>
+          <a:lnRef idx="1">
+            <a:schemeClr val="accent1"/>
+          </a:lnRef>
+          <a:fillRef idx="0">
+            <a:schemeClr val="accent1"/>
+          </a:fillRef>
+          <a:effectRef idx="0">
+            <a:schemeClr val="accent1"/>
+          </a:effectRef>
+          <a:fontRef idx="minor">
+            <a:schemeClr val="tx1"/>
+          </a:fontRef>
+        </p:style>
+      </p:cxnSp>
+      <p:cxnSp>
+        <p:nvCxnSpPr>
+          <p:cNvPr id="165" name="Connector: Elbow 164">
+            <a:extLst>
+              <a:ext uri="{FF2B5EF4-FFF2-40B4-BE49-F238E27FC236}">
+                <a16:creationId xmlns:a16="http://schemas.microsoft.com/office/drawing/2014/main" id="{8BB5AA42-9809-422A-73F4-257B058EE72E}"/>
+              </a:ext>
+            </a:extLst>
+          </p:cNvPr>
+          <p:cNvCxnSpPr>
+            <a:cxnSpLocks/>
+            <a:stCxn id="151" idx="2"/>
+            <a:endCxn id="51" idx="2"/>
+          </p:cNvCxnSpPr>
+          <p:nvPr/>
+        </p:nvCxnSpPr>
+        <p:spPr>
+          <a:xfrm rot="5400000" flipH="1">
+            <a:off x="7165191" y="3498058"/>
+            <a:ext cx="1287336" cy="4315554"/>
+          </a:xfrm>
+          <a:prstGeom prst="bentConnector3">
+            <a:avLst>
+              <a:gd name="adj1" fmla="val -17758"/>
+            </a:avLst>
+          </a:prstGeom>
+          <a:ln w="19050">
+            <a:solidFill>
+              <a:schemeClr val="tx1"/>
+            </a:solidFill>
+            <a:tailEnd type="triangle"/>
+          </a:ln>
+        </p:spPr>
+        <p:style>
+          <a:lnRef idx="1">
+            <a:schemeClr val="accent1"/>
+          </a:lnRef>
+          <a:fillRef idx="0">
+            <a:schemeClr val="accent1"/>
+          </a:fillRef>
+          <a:effectRef idx="0">
+            <a:schemeClr val="accent1"/>
+          </a:effectRef>
+          <a:fontRef idx="minor">
+            <a:schemeClr val="tx1"/>
+          </a:fontRef>
+        </p:style>
+      </p:cxnSp>
+      <p:sp>
+        <p:nvSpPr>
+          <p:cNvPr id="3" name="Rectangle 2">
+            <a:extLst>
+              <a:ext uri="{FF2B5EF4-FFF2-40B4-BE49-F238E27FC236}">
+                <a16:creationId xmlns:a16="http://schemas.microsoft.com/office/drawing/2014/main" id="{A8AB2565-D89A-3315-CF9A-1DDE6A065D79}"/>
+              </a:ext>
+            </a:extLst>
+          </p:cNvPr>
+          <p:cNvSpPr/>
+          <p:nvPr/>
+        </p:nvSpPr>
+        <p:spPr>
+          <a:xfrm>
+            <a:off x="2318750" y="3736558"/>
             <a:ext cx="1846140" cy="629676"/>
           </a:xfrm>
           <a:prstGeom prst="rect">
@@ -5531,7 +5844,7 @@
             <a:pPr algn="ctr"/>
             <a:r>
               <a:rPr lang="en-GB" dirty="0" err="1"/>
-              <a:t>ScanningScreen</a:t>
+              <a:t>DisplaySolution</a:t>
             </a:r>
             <a:endParaRPr lang="LID4096" dirty="0"/>
           </a:p>
@@ -5539,214 +5852,27 @@
       </p:sp>
       <p:cxnSp>
         <p:nvCxnSpPr>
-          <p:cNvPr id="152" name="Straight Arrow Connector 151">
-            <a:extLst>
-              <a:ext uri="{FF2B5EF4-FFF2-40B4-BE49-F238E27FC236}">
-                <a16:creationId xmlns:a16="http://schemas.microsoft.com/office/drawing/2014/main" id="{C7E22575-6C4D-B939-7776-31987DE54368}"/>
+          <p:cNvPr id="15" name="Connector: Elbow 14">
+            <a:extLst>
+              <a:ext uri="{FF2B5EF4-FFF2-40B4-BE49-F238E27FC236}">
+                <a16:creationId xmlns:a16="http://schemas.microsoft.com/office/drawing/2014/main" id="{D354311A-606C-4A5A-DF0C-4A025B382AB1}"/>
               </a:ext>
             </a:extLst>
           </p:cNvPr>
           <p:cNvCxnSpPr>
             <a:cxnSpLocks/>
-            <a:stCxn id="134" idx="2"/>
-            <a:endCxn id="140" idx="0"/>
+            <a:stCxn id="3" idx="3"/>
           </p:cNvCxnSpPr>
           <p:nvPr/>
         </p:nvCxnSpPr>
         <p:spPr>
-          <a:xfrm>
-            <a:off x="9966636" y="4447313"/>
-            <a:ext cx="0" cy="278703"/>
-          </a:xfrm>
-          <a:prstGeom prst="straightConnector1">
-            <a:avLst/>
-          </a:prstGeom>
-          <a:ln w="28575">
-            <a:solidFill>
-              <a:schemeClr val="tx1"/>
-            </a:solidFill>
-            <a:tailEnd type="triangle"/>
-          </a:ln>
-        </p:spPr>
-        <p:style>
-          <a:lnRef idx="1">
-            <a:schemeClr val="accent1"/>
-          </a:lnRef>
-          <a:fillRef idx="0">
-            <a:schemeClr val="accent1"/>
-          </a:fillRef>
-          <a:effectRef idx="0">
-            <a:schemeClr val="accent1"/>
-          </a:effectRef>
-          <a:fontRef idx="minor">
-            <a:schemeClr val="tx1"/>
-          </a:fontRef>
-        </p:style>
-      </p:cxnSp>
-      <p:cxnSp>
-        <p:nvCxnSpPr>
-          <p:cNvPr id="155" name="Straight Arrow Connector 154">
-            <a:extLst>
-              <a:ext uri="{FF2B5EF4-FFF2-40B4-BE49-F238E27FC236}">
-                <a16:creationId xmlns:a16="http://schemas.microsoft.com/office/drawing/2014/main" id="{DCB2E483-F13D-2399-130B-52CA29F03869}"/>
-              </a:ext>
-            </a:extLst>
-          </p:cNvPr>
-          <p:cNvCxnSpPr>
-            <a:cxnSpLocks/>
-            <a:stCxn id="140" idx="2"/>
-            <a:endCxn id="151" idx="0"/>
-          </p:cNvCxnSpPr>
-          <p:nvPr/>
-        </p:nvCxnSpPr>
-        <p:spPr>
-          <a:xfrm>
-            <a:off x="9966636" y="5355692"/>
-            <a:ext cx="0" cy="314135"/>
-          </a:xfrm>
-          <a:prstGeom prst="straightConnector1">
-            <a:avLst/>
-          </a:prstGeom>
-          <a:ln w="28575">
-            <a:solidFill>
-              <a:schemeClr val="tx1"/>
-            </a:solidFill>
-            <a:tailEnd type="triangle"/>
-          </a:ln>
-        </p:spPr>
-        <p:style>
-          <a:lnRef idx="1">
-            <a:schemeClr val="accent1"/>
-          </a:lnRef>
-          <a:fillRef idx="0">
-            <a:schemeClr val="accent1"/>
-          </a:fillRef>
-          <a:effectRef idx="0">
-            <a:schemeClr val="accent1"/>
-          </a:effectRef>
-          <a:fontRef idx="minor">
-            <a:schemeClr val="tx1"/>
-          </a:fontRef>
-        </p:style>
-      </p:cxnSp>
-      <p:cxnSp>
-        <p:nvCxnSpPr>
-          <p:cNvPr id="158" name="Connector: Elbow 157">
-            <a:extLst>
-              <a:ext uri="{FF2B5EF4-FFF2-40B4-BE49-F238E27FC236}">
-                <a16:creationId xmlns:a16="http://schemas.microsoft.com/office/drawing/2014/main" id="{F168582A-3304-B5FE-C1B4-E0BF93408591}"/>
-              </a:ext>
-            </a:extLst>
-          </p:cNvPr>
-          <p:cNvCxnSpPr>
-            <a:cxnSpLocks/>
-            <a:stCxn id="151" idx="3"/>
-            <a:endCxn id="134" idx="3"/>
-          </p:cNvCxnSpPr>
-          <p:nvPr/>
-        </p:nvCxnSpPr>
-        <p:spPr>
           <a:xfrm flipV="1">
-            <a:off x="10889706" y="4132475"/>
-            <a:ext cx="12700" cy="1852190"/>
+            <a:off x="4164890" y="3812757"/>
+            <a:ext cx="665331" cy="238639"/>
           </a:xfrm>
           <a:prstGeom prst="bentConnector3">
             <a:avLst>
-              <a:gd name="adj1" fmla="val 1800000"/>
-            </a:avLst>
-          </a:prstGeom>
-          <a:ln w="19050">
-            <a:solidFill>
-              <a:schemeClr val="tx1"/>
-            </a:solidFill>
-            <a:tailEnd type="triangle"/>
-          </a:ln>
-        </p:spPr>
-        <p:style>
-          <a:lnRef idx="1">
-            <a:schemeClr val="accent1"/>
-          </a:lnRef>
-          <a:fillRef idx="0">
-            <a:schemeClr val="accent1"/>
-          </a:fillRef>
-          <a:effectRef idx="0">
-            <a:schemeClr val="accent1"/>
-          </a:effectRef>
-          <a:fontRef idx="minor">
-            <a:schemeClr val="tx1"/>
-          </a:fontRef>
-        </p:style>
-      </p:cxnSp>
-      <p:cxnSp>
-        <p:nvCxnSpPr>
-          <p:cNvPr id="162" name="Connector: Elbow 161">
-            <a:extLst>
-              <a:ext uri="{FF2B5EF4-FFF2-40B4-BE49-F238E27FC236}">
-                <a16:creationId xmlns:a16="http://schemas.microsoft.com/office/drawing/2014/main" id="{C36BCE45-8FCE-391A-9D6A-EE866F9FFD3B}"/>
-              </a:ext>
-            </a:extLst>
-          </p:cNvPr>
-          <p:cNvCxnSpPr>
-            <a:cxnSpLocks/>
-            <a:stCxn id="151" idx="1"/>
-            <a:endCxn id="23" idx="2"/>
-          </p:cNvCxnSpPr>
-          <p:nvPr/>
-        </p:nvCxnSpPr>
-        <p:spPr>
-          <a:xfrm rot="10800000">
-            <a:off x="8661234" y="3377477"/>
-            <a:ext cx="382333" cy="2607189"/>
-          </a:xfrm>
-          <a:prstGeom prst="bentConnector2">
-            <a:avLst/>
-          </a:prstGeom>
-          <a:ln w="19050">
-            <a:solidFill>
-              <a:schemeClr val="tx1"/>
-            </a:solidFill>
-            <a:tailEnd type="triangle"/>
-          </a:ln>
-        </p:spPr>
-        <p:style>
-          <a:lnRef idx="1">
-            <a:schemeClr val="accent1"/>
-          </a:lnRef>
-          <a:fillRef idx="0">
-            <a:schemeClr val="accent1"/>
-          </a:fillRef>
-          <a:effectRef idx="0">
-            <a:schemeClr val="accent1"/>
-          </a:effectRef>
-          <a:fontRef idx="minor">
-            <a:schemeClr val="tx1"/>
-          </a:fontRef>
-        </p:style>
-      </p:cxnSp>
-      <p:cxnSp>
-        <p:nvCxnSpPr>
-          <p:cNvPr id="165" name="Connector: Elbow 164">
-            <a:extLst>
-              <a:ext uri="{FF2B5EF4-FFF2-40B4-BE49-F238E27FC236}">
-                <a16:creationId xmlns:a16="http://schemas.microsoft.com/office/drawing/2014/main" id="{8BB5AA42-9809-422A-73F4-257B058EE72E}"/>
-              </a:ext>
-            </a:extLst>
-          </p:cNvPr>
-          <p:cNvCxnSpPr>
-            <a:cxnSpLocks/>
-            <a:stCxn id="151" idx="2"/>
-            <a:endCxn id="51" idx="2"/>
-          </p:cNvCxnSpPr>
-          <p:nvPr/>
-        </p:nvCxnSpPr>
-        <p:spPr>
-          <a:xfrm rot="5400000" flipH="1">
-            <a:off x="7165191" y="3498058"/>
-            <a:ext cx="1287336" cy="4315554"/>
-          </a:xfrm>
-          <a:prstGeom prst="bentConnector3">
-            <a:avLst>
-              <a:gd name="adj1" fmla="val -17758"/>
+              <a:gd name="adj1" fmla="val 50000"/>
             </a:avLst>
           </a:prstGeom>
           <a:ln w="19050">

</xml_diff>